<commit_message>
Add the latest poster and logs.
</commit_message>
<xml_diff>
--- a/poster.pptx
+++ b/poster.pptx
@@ -3093,7 +3093,7 @@
                   </a:solidFill>
                   <a:latin typeface="Arial Narrow" panose="020B0606020202030204" pitchFamily="34" charset="0"/>
                 </a:rPr>
-                <a:t>We defined our own virtual creature in Unity3D to experiment a naïve evolution loosely inspired by Karl Sims virtual creatures [1]. We use a multi joint creature (so-called robotic-arm), with the aim of reaching to a target. This creature has a fixed morphology and its behavior determined by genetic algorithm trying to find the optimal joint angles which takes the end-effector (the end-point of the arm) to the target. The search space is a function of the length of arm from the base to the end-factor in initial position where are angles are zero. The complexity of the problem depends on </a:t>
+                <a:t>We defined our own virtual creature in Unity3D to experiment a naïve evolution loosely inspired by Karl Sims virtual creatures [1]. We use a multi joint creature (so-called robotic-arm), with the aim of reaching to a target. This creature has a fixed morphology and its behavior determined by genetic algorithm trying to find the optimal joint angles which takes the end-effector (the end-point of the arm) to the target. The search space is a function of the length of arm from the base to the end-effector in initial position where are angles are zero. The complexity of the problem depends on </a:t>
               </a:r>
             </a:p>
             <a:p>
@@ -3369,7 +3369,29 @@
                   </a:solidFill>
                   <a:latin typeface="Arial Narrow" panose="020B0606020202030204" pitchFamily="34" charset="0"/>
                 </a:rPr>
-                <a:t>We implemented a genetic algorithm and a random search for comparison. The chromosome consists of real-value genes where each represent one joint. Each joint consists of 3 angles. Possible rotations around x, y, or z axes in 3D space are depicted in Fig. 1. We instantiate the creatures as the population and evolve them using genetic operations at each iteration. transferring elites directly to the next generation we ensure that we are going to be at least as good as previous generation. Using a combination of elites and non-elites for crossover ensures diversity in the offspring. Mutation for elites are done only performed on last genes which represent closer joints to 	the end-effector ensures more diversity around. the 	                    target. This process is depicted in Figure-2.</a:t>
+                <a:t>We implemented a genetic algorithm and a random search for comparison. The chromosome consists of real-value genes where each represent one joint. Each joint consists of 3 angles. Possible rotations around x, y, or z axes in 3D space are depicted in Fig. 1. We instantiate the creatures as the population and evolve them using genetic operations at each iteration. transferring elites directly to the next generation we ensure that we are going to be at least as good as previous generation. Using a combination of elites and non-elites for crossover ensures diversity in the offspring. Mutation for </a:t>
+              </a:r>
+              <a:r>
+                <a:rPr lang="en-US" sz="3600" smtClean="0">
+                  <a:solidFill>
+                    <a:schemeClr val="tx2">
+                      <a:lumMod val="50000"/>
+                    </a:schemeClr>
+                  </a:solidFill>
+                  <a:latin typeface="Arial Narrow" panose="020B0606020202030204" pitchFamily="34" charset="0"/>
+                </a:rPr>
+                <a:t>elites is only </a:t>
+              </a:r>
+              <a:r>
+                <a:rPr lang="en-US" sz="3600" dirty="0" smtClean="0">
+                  <a:solidFill>
+                    <a:schemeClr val="tx2">
+                      <a:lumMod val="50000"/>
+                    </a:schemeClr>
+                  </a:solidFill>
+                  <a:latin typeface="Arial Narrow" panose="020B0606020202030204" pitchFamily="34" charset="0"/>
+                </a:rPr>
+                <a:t>performed on last genes which represent closer joints to 	the end-effector ensures more diversity around. the 	                    target. This process is depicted in Figure-2.</a:t>
               </a:r>
               <a:endParaRPr lang="en-US" sz="3600" dirty="0">
                 <a:solidFill>
@@ -3515,7 +3537,7 @@
                   </a:solidFill>
                   <a:latin typeface="Arial Narrow" panose="020B0606020202030204" pitchFamily="34" charset="0"/>
                 </a:rPr>
-                <a:t>transfer directly to the next generation set to 30. Each individual </a:t>
+                <a:t>transfer directly to the next generation is set to 30. Each individual </a:t>
               </a:r>
             </a:p>
             <a:p>
@@ -3529,7 +3551,7 @@
                   </a:solidFill>
                   <a:latin typeface="Arial Narrow" panose="020B0606020202030204" pitchFamily="34" charset="0"/>
                 </a:rPr>
-                <a:t>may get mutated with a chance of 1% or crossed-over. For the crossover, 40% of the elites used as parents to generate new off-springs. Rest elites crossed over randomly with the rest of the remained population. </a:t>
+                <a:t>may get mutated with a chance of 1% or crossed-over. For the crossover, 40% of the elites are used as parents to generate new off-springs. Rest of the elites crossed over randomly with the remaining population. </a:t>
               </a:r>
               <a:endParaRPr lang="en-US" sz="3600" dirty="0" smtClean="0">
                 <a:solidFill>
@@ -4076,7 +4098,7 @@
               <a:alpha val="10000"/>
             </a:schemeClr>
           </a:solidFill>
-          <a:ln w="63500">
+          <a:ln w="50800">
             <a:solidFill>
               <a:schemeClr val="tx2">
                 <a:lumMod val="50000"/>

</xml_diff>